<commit_message>
Kleine Änderung an Präsi
</commit_message>
<xml_diff>
--- a/presentation/presentation.pptx
+++ b/presentation/presentation.pptx
@@ -135,6 +135,9 @@
           </p14:sldIdLst>
         </p14:section>
       </p14:sectionLst>
+    </p:ext>
+    <p:ext uri="{EFAFB233-063F-42B5-8137-9DF3F51BA10A}">
+      <p15:sldGuideLst xmlns:p15="http://schemas.microsoft.com/office/powerpoint/2012/main"/>
     </p:ext>
   </p:extLst>
 </p:presentation>
@@ -4119,7 +4122,31 @@
                   <a:schemeClr val="bg1"/>
                 </a:solidFill>
               </a:rPr>
-              <a:t>RMI für Alternativ-Implementierung</a:t>
+              <a:t>RMI </a:t>
+            </a:r>
+            <a:r>
+              <a:rPr lang="de-AT" dirty="0" smtClean="0">
+                <a:solidFill>
+                  <a:schemeClr val="bg1"/>
+                </a:solidFill>
+              </a:rPr>
+              <a:t>als</a:t>
+            </a:r>
+            <a:r>
+              <a:rPr lang="de-AT" dirty="0" smtClean="0">
+                <a:solidFill>
+                  <a:schemeClr val="bg1"/>
+                </a:solidFill>
+              </a:rPr>
+              <a:t> </a:t>
+            </a:r>
+            <a:r>
+              <a:rPr lang="de-AT" dirty="0" smtClean="0">
+                <a:solidFill>
+                  <a:schemeClr val="bg1"/>
+                </a:solidFill>
+              </a:rPr>
+              <a:t>Alternativ-Implementierung</a:t>
             </a:r>
           </a:p>
           <a:p>
@@ -4147,6 +4174,26 @@
               </a:rPr>
               <a:t>Buildsystem</a:t>
             </a:r>
+            <a:endParaRPr lang="de-AT" dirty="0" smtClean="0">
+              <a:solidFill>
+                <a:schemeClr val="bg1"/>
+              </a:solidFill>
+            </a:endParaRPr>
+          </a:p>
+          <a:p>
+            <a:r>
+              <a:rPr lang="de-AT" dirty="0" smtClean="0">
+                <a:solidFill>
+                  <a:schemeClr val="bg1"/>
+                </a:solidFill>
+              </a:rPr>
+              <a:t>GIT als CVS</a:t>
+            </a:r>
+          </a:p>
+          <a:p>
+            <a:pPr marL="0" indent="0">
+              <a:buNone/>
+            </a:pPr>
             <a:endParaRPr lang="de-AT" dirty="0">
               <a:solidFill>
                 <a:schemeClr val="bg1"/>
@@ -6408,11 +6455,6 @@
               </a:rPr>
               <a:t>LOC/ZEIT</a:t>
             </a:r>
-            <a:endParaRPr lang="de-AT" dirty="0" smtClean="0">
-              <a:solidFill>
-                <a:schemeClr val="bg1"/>
-              </a:solidFill>
-            </a:endParaRPr>
           </a:p>
         </p:txBody>
       </p:sp>

</xml_diff>